<commit_message>
Fix PPT links. Simplify variables PPT.
</commit_message>
<xml_diff>
--- a/IntroToJS/JavaScriptVariables.pptx
+++ b/IntroToJS/JavaScriptVariables.pptx
@@ -5,7 +5,7 @@
     <p:sldMasterId id="2147483648" r:id="rId1"/>
   </p:sldMasterIdLst>
   <p:notesMasterIdLst>
-    <p:notesMasterId r:id="rId16"/>
+    <p:notesMasterId r:id="rId13"/>
   </p:notesMasterIdLst>
   <p:sldIdLst>
     <p:sldId id="258" r:id="rId2"/>
@@ -18,10 +18,7 @@
     <p:sldId id="320" r:id="rId9"/>
     <p:sldId id="321" r:id="rId10"/>
     <p:sldId id="322" r:id="rId11"/>
-    <p:sldId id="325" r:id="rId12"/>
-    <p:sldId id="323" r:id="rId13"/>
-    <p:sldId id="324" r:id="rId14"/>
-    <p:sldId id="326" r:id="rId15"/>
+    <p:sldId id="326" r:id="rId12"/>
   </p:sldIdLst>
   <p:sldSz cx="12192000" cy="6858000"/>
   <p:notesSz cx="6858000" cy="9144000"/>
@@ -221,7 +218,7 @@
           <a:p>
             <a:fld id="{19104133-B5B0-4351-8158-4F0E5EB1E2BF}" type="datetimeFigureOut">
               <a:rPr lang="en-US" smtClean="0"/>
-              <a:t>2/24/2023</a:t>
+              <a:t>3/1/2023</a:t>
             </a:fld>
             <a:endParaRPr lang="en-US"/>
           </a:p>
@@ -588,286 +585,6 @@
 </p:notes>
 </file>
 
-<file path=ppt/notesSlides/notesSlide10.xml><?xml version="1.0" encoding="utf-8"?>
-<p:notes xmlns:a="http://schemas.openxmlformats.org/drawingml/2006/main" xmlns:r="http://schemas.openxmlformats.org/officeDocument/2006/relationships" xmlns:p="http://schemas.openxmlformats.org/presentationml/2006/main">
-  <p:cSld>
-    <p:spTree>
-      <p:nvGrpSpPr>
-        <p:cNvPr id="1" name=""/>
-        <p:cNvGrpSpPr/>
-        <p:nvPr/>
-      </p:nvGrpSpPr>
-      <p:grpSpPr>
-        <a:xfrm>
-          <a:off x="0" y="0"/>
-          <a:ext cx="0" cy="0"/>
-          <a:chOff x="0" y="0"/>
-          <a:chExt cx="0" cy="0"/>
-        </a:xfrm>
-      </p:grpSpPr>
-      <p:sp>
-        <p:nvSpPr>
-          <p:cNvPr id="2" name="Slide Image Placeholder 1"/>
-          <p:cNvSpPr>
-            <a:spLocks noGrp="1" noRot="1" noChangeAspect="1"/>
-          </p:cNvSpPr>
-          <p:nvPr>
-            <p:ph type="sldImg"/>
-          </p:nvPr>
-        </p:nvSpPr>
-        <p:spPr/>
-      </p:sp>
-      <p:sp>
-        <p:nvSpPr>
-          <p:cNvPr id="3" name="Notes Placeholder 2"/>
-          <p:cNvSpPr>
-            <a:spLocks noGrp="1"/>
-          </p:cNvSpPr>
-          <p:nvPr>
-            <p:ph type="body" idx="1"/>
-          </p:nvPr>
-        </p:nvSpPr>
-        <p:spPr/>
-        <p:txBody>
-          <a:bodyPr/>
-          <a:lstStyle/>
-          <a:p>
-            <a:r>
-              <a:rPr lang="en-US" dirty="0"/>
-              <a:t>Let’s take a look at this example in action!</a:t>
-            </a:r>
-            <a:endParaRPr lang="en-US" baseline="0" dirty="0"/>
-          </a:p>
-        </p:txBody>
-      </p:sp>
-      <p:sp>
-        <p:nvSpPr>
-          <p:cNvPr id="4" name="Slide Number Placeholder 3"/>
-          <p:cNvSpPr>
-            <a:spLocks noGrp="1"/>
-          </p:cNvSpPr>
-          <p:nvPr>
-            <p:ph type="sldNum" sz="quarter" idx="10"/>
-          </p:nvPr>
-        </p:nvSpPr>
-        <p:spPr/>
-        <p:txBody>
-          <a:bodyPr/>
-          <a:lstStyle/>
-          <a:p>
-            <a:fld id="{DEC8F7F9-57EC-49CF-9FCD-2B781E4B449F}" type="slidenum">
-              <a:rPr lang="en-US" smtClean="0"/>
-              <a:t>11</a:t>
-            </a:fld>
-            <a:endParaRPr lang="en-US"/>
-          </a:p>
-        </p:txBody>
-      </p:sp>
-    </p:spTree>
-    <p:extLst>
-      <p:ext uri="{BB962C8B-B14F-4D97-AF65-F5344CB8AC3E}">
-        <p14:creationId xmlns:p14="http://schemas.microsoft.com/office/powerpoint/2010/main" val="2234989272"/>
-      </p:ext>
-    </p:extLst>
-  </p:cSld>
-  <p:clrMapOvr>
-    <a:masterClrMapping/>
-  </p:clrMapOvr>
-</p:notes>
-</file>
-
-<file path=ppt/notesSlides/notesSlide11.xml><?xml version="1.0" encoding="utf-8"?>
-<p:notes xmlns:a="http://schemas.openxmlformats.org/drawingml/2006/main" xmlns:r="http://schemas.openxmlformats.org/officeDocument/2006/relationships" xmlns:p="http://schemas.openxmlformats.org/presentationml/2006/main">
-  <p:cSld>
-    <p:spTree>
-      <p:nvGrpSpPr>
-        <p:cNvPr id="1" name=""/>
-        <p:cNvGrpSpPr/>
-        <p:nvPr/>
-      </p:nvGrpSpPr>
-      <p:grpSpPr>
-        <a:xfrm>
-          <a:off x="0" y="0"/>
-          <a:ext cx="0" cy="0"/>
-          <a:chOff x="0" y="0"/>
-          <a:chExt cx="0" cy="0"/>
-        </a:xfrm>
-      </p:grpSpPr>
-      <p:sp>
-        <p:nvSpPr>
-          <p:cNvPr id="2" name="Slide Image Placeholder 1"/>
-          <p:cNvSpPr>
-            <a:spLocks noGrp="1" noRot="1" noChangeAspect="1"/>
-          </p:cNvSpPr>
-          <p:nvPr>
-            <p:ph type="sldImg"/>
-          </p:nvPr>
-        </p:nvSpPr>
-        <p:spPr/>
-      </p:sp>
-      <p:sp>
-        <p:nvSpPr>
-          <p:cNvPr id="3" name="Notes Placeholder 2"/>
-          <p:cNvSpPr>
-            <a:spLocks noGrp="1"/>
-          </p:cNvSpPr>
-          <p:nvPr>
-            <p:ph type="body" idx="1"/>
-          </p:nvPr>
-        </p:nvSpPr>
-        <p:spPr/>
-        <p:txBody>
-          <a:bodyPr/>
-          <a:lstStyle/>
-          <a:p>
-            <a:r>
-              <a:rPr lang="en-US" dirty="0"/>
-              <a:t>Allow the students a few minutes to</a:t>
-            </a:r>
-            <a:r>
-              <a:rPr lang="en-US" baseline="0" dirty="0"/>
-              <a:t> attempt the challenge</a:t>
-            </a:r>
-            <a:endParaRPr lang="en-US" dirty="0"/>
-          </a:p>
-        </p:txBody>
-      </p:sp>
-      <p:sp>
-        <p:nvSpPr>
-          <p:cNvPr id="4" name="Slide Number Placeholder 3"/>
-          <p:cNvSpPr>
-            <a:spLocks noGrp="1"/>
-          </p:cNvSpPr>
-          <p:nvPr>
-            <p:ph type="sldNum" sz="quarter" idx="10"/>
-          </p:nvPr>
-        </p:nvSpPr>
-        <p:spPr/>
-        <p:txBody>
-          <a:bodyPr/>
-          <a:lstStyle/>
-          <a:p>
-            <a:fld id="{DEC8F7F9-57EC-49CF-9FCD-2B781E4B449F}" type="slidenum">
-              <a:rPr lang="en-US" smtClean="0"/>
-              <a:t>12</a:t>
-            </a:fld>
-            <a:endParaRPr lang="en-US"/>
-          </a:p>
-        </p:txBody>
-      </p:sp>
-    </p:spTree>
-    <p:extLst>
-      <p:ext uri="{BB962C8B-B14F-4D97-AF65-F5344CB8AC3E}">
-        <p14:creationId xmlns:p14="http://schemas.microsoft.com/office/powerpoint/2010/main" val="2524834435"/>
-      </p:ext>
-    </p:extLst>
-  </p:cSld>
-  <p:clrMapOvr>
-    <a:masterClrMapping/>
-  </p:clrMapOvr>
-</p:notes>
-</file>
-
-<file path=ppt/notesSlides/notesSlide12.xml><?xml version="1.0" encoding="utf-8"?>
-<p:notes xmlns:a="http://schemas.openxmlformats.org/drawingml/2006/main" xmlns:r="http://schemas.openxmlformats.org/officeDocument/2006/relationships" xmlns:p="http://schemas.openxmlformats.org/presentationml/2006/main">
-  <p:cSld>
-    <p:spTree>
-      <p:nvGrpSpPr>
-        <p:cNvPr id="1" name=""/>
-        <p:cNvGrpSpPr/>
-        <p:nvPr/>
-      </p:nvGrpSpPr>
-      <p:grpSpPr>
-        <a:xfrm>
-          <a:off x="0" y="0"/>
-          <a:ext cx="0" cy="0"/>
-          <a:chOff x="0" y="0"/>
-          <a:chExt cx="0" cy="0"/>
-        </a:xfrm>
-      </p:grpSpPr>
-      <p:sp>
-        <p:nvSpPr>
-          <p:cNvPr id="2" name="Slide Image Placeholder 1"/>
-          <p:cNvSpPr>
-            <a:spLocks noGrp="1" noRot="1" noChangeAspect="1"/>
-          </p:cNvSpPr>
-          <p:nvPr>
-            <p:ph type="sldImg"/>
-          </p:nvPr>
-        </p:nvSpPr>
-        <p:spPr/>
-      </p:sp>
-      <p:sp>
-        <p:nvSpPr>
-          <p:cNvPr id="3" name="Notes Placeholder 2"/>
-          <p:cNvSpPr>
-            <a:spLocks noGrp="1"/>
-          </p:cNvSpPr>
-          <p:nvPr>
-            <p:ph type="body" idx="1"/>
-          </p:nvPr>
-        </p:nvSpPr>
-        <p:spPr/>
-        <p:txBody>
-          <a:bodyPr/>
-          <a:lstStyle/>
-          <a:p>
-            <a:r>
-              <a:rPr lang="en-US" dirty="0"/>
-              <a:t>Display the solution</a:t>
-            </a:r>
-            <a:r>
-              <a:rPr lang="en-US" baseline="0" dirty="0"/>
-              <a:t> for the students. Note that the user’s answer is stored in the </a:t>
-            </a:r>
-            <a:r>
-              <a:rPr lang="en-US" b="1" baseline="0" dirty="0"/>
-              <a:t>name</a:t>
-            </a:r>
-            <a:r>
-              <a:rPr lang="en-US" b="0" baseline="0" dirty="0"/>
-              <a:t> variable, and then combined with “Hello, “ for the message.</a:t>
-            </a:r>
-            <a:endParaRPr lang="en-US" dirty="0"/>
-          </a:p>
-        </p:txBody>
-      </p:sp>
-      <p:sp>
-        <p:nvSpPr>
-          <p:cNvPr id="4" name="Slide Number Placeholder 3"/>
-          <p:cNvSpPr>
-            <a:spLocks noGrp="1"/>
-          </p:cNvSpPr>
-          <p:nvPr>
-            <p:ph type="sldNum" sz="quarter" idx="10"/>
-          </p:nvPr>
-        </p:nvSpPr>
-        <p:spPr/>
-        <p:txBody>
-          <a:bodyPr/>
-          <a:lstStyle/>
-          <a:p>
-            <a:fld id="{DEC8F7F9-57EC-49CF-9FCD-2B781E4B449F}" type="slidenum">
-              <a:rPr lang="en-US" smtClean="0"/>
-              <a:t>13</a:t>
-            </a:fld>
-            <a:endParaRPr lang="en-US"/>
-          </a:p>
-        </p:txBody>
-      </p:sp>
-    </p:spTree>
-    <p:extLst>
-      <p:ext uri="{BB962C8B-B14F-4D97-AF65-F5344CB8AC3E}">
-        <p14:creationId xmlns:p14="http://schemas.microsoft.com/office/powerpoint/2010/main" val="3938198376"/>
-      </p:ext>
-    </p:extLst>
-  </p:cSld>
-  <p:clrMapOvr>
-    <a:masterClrMapping/>
-  </p:clrMapOvr>
-</p:notes>
-</file>
-
 <file path=ppt/notesSlides/notesSlide2.xml><?xml version="1.0" encoding="utf-8"?>
 <p:notes xmlns:a="http://schemas.openxmlformats.org/drawingml/2006/main" xmlns:r="http://schemas.openxmlformats.org/officeDocument/2006/relationships" xmlns:p="http://schemas.openxmlformats.org/presentationml/2006/main">
   <p:cSld>
@@ -1799,16 +1516,6 @@
               <a:rPr lang="en-US" baseline="0" dirty="0"/>
               <a:t> this code will do. What will happen if the user says “good”? What if they say “bad”?</a:t>
             </a:r>
-          </a:p>
-          <a:p>
-            <a:endParaRPr lang="en-US" baseline="0" dirty="0"/>
-          </a:p>
-          <a:p>
-            <a:r>
-              <a:rPr lang="en-US" baseline="0" dirty="0"/>
-              <a:t>Let the students copy the code into their own file to play around and see what happens.</a:t>
-            </a:r>
-            <a:endParaRPr lang="en-US" dirty="0"/>
           </a:p>
         </p:txBody>
       </p:sp>
@@ -2030,7 +1737,7 @@
             <a:fld id="{1C2D31DE-C454-491C-B5C3-F097855E3DF7}" type="datetime4">
               <a:rPr lang="en-US" smtClean="0"/>
               <a:pPr/>
-              <a:t>February 24, 2023</a:t>
+              <a:t>March 1, 2023</a:t>
             </a:fld>
             <a:endParaRPr lang="en-US" dirty="0"/>
           </a:p>
@@ -5422,7 +5129,7 @@
           <a:p>
             <a:fld id="{5958763E-B898-436D-883D-03711491D54A}" type="datetimeFigureOut">
               <a:rPr lang="en-US" smtClean="0"/>
-              <a:t>2/24/2023</a:t>
+              <a:t>3/1/2023</a:t>
             </a:fld>
             <a:endParaRPr lang="en-US"/>
           </a:p>
@@ -5615,7 +5322,7 @@
           <a:p>
             <a:fld id="{5958763E-B898-436D-883D-03711491D54A}" type="datetimeFigureOut">
               <a:rPr lang="en-US" smtClean="0"/>
-              <a:t>2/24/2023</a:t>
+              <a:t>3/1/2023</a:t>
             </a:fld>
             <a:endParaRPr lang="en-US"/>
           </a:p>
@@ -5865,7 +5572,7 @@
           <a:p>
             <a:fld id="{5958763E-B898-436D-883D-03711491D54A}" type="datetimeFigureOut">
               <a:rPr lang="en-US" smtClean="0"/>
-              <a:t>2/24/2023</a:t>
+              <a:t>3/1/2023</a:t>
             </a:fld>
             <a:endParaRPr lang="en-US"/>
           </a:p>
@@ -6213,7 +5920,7 @@
           <a:p>
             <a:fld id="{5958763E-B898-436D-883D-03711491D54A}" type="datetimeFigureOut">
               <a:rPr lang="en-US" smtClean="0"/>
-              <a:t>2/24/2023</a:t>
+              <a:t>3/1/2023</a:t>
             </a:fld>
             <a:endParaRPr lang="en-US"/>
           </a:p>
@@ -6629,7 +6336,7 @@
           <a:p>
             <a:fld id="{5958763E-B898-436D-883D-03711491D54A}" type="datetimeFigureOut">
               <a:rPr lang="en-US" smtClean="0"/>
-              <a:t>2/24/2023</a:t>
+              <a:t>3/1/2023</a:t>
             </a:fld>
             <a:endParaRPr lang="en-US"/>
           </a:p>
@@ -7130,7 +6837,7 @@
           <a:p>
             <a:fld id="{5958763E-B898-436D-883D-03711491D54A}" type="datetimeFigureOut">
               <a:rPr lang="en-US" smtClean="0"/>
-              <a:t>2/24/2023</a:t>
+              <a:t>3/1/2023</a:t>
             </a:fld>
             <a:endParaRPr lang="en-US"/>
           </a:p>
@@ -7581,7 +7288,7 @@
           <a:p>
             <a:fld id="{5958763E-B898-436D-883D-03711491D54A}" type="datetimeFigureOut">
               <a:rPr lang="en-US" smtClean="0"/>
-              <a:t>2/24/2023</a:t>
+              <a:t>3/1/2023</a:t>
             </a:fld>
             <a:endParaRPr lang="en-US"/>
           </a:p>
@@ -8192,7 +7899,7 @@
           <a:p>
             <a:fld id="{5958763E-B898-436D-883D-03711491D54A}" type="datetimeFigureOut">
               <a:rPr lang="en-US" smtClean="0"/>
-              <a:t>2/24/2023</a:t>
+              <a:t>3/1/2023</a:t>
             </a:fld>
             <a:endParaRPr lang="en-US"/>
           </a:p>
@@ -8963,7 +8670,7 @@
           <a:p>
             <a:fld id="{5958763E-B898-436D-883D-03711491D54A}" type="datetimeFigureOut">
               <a:rPr lang="en-US" smtClean="0"/>
-              <a:t>2/24/2023</a:t>
+              <a:t>3/1/2023</a:t>
             </a:fld>
             <a:endParaRPr lang="en-US"/>
           </a:p>
@@ -9067,7 +8774,7 @@
           <a:p>
             <a:fld id="{5958763E-B898-436D-883D-03711491D54A}" type="datetimeFigureOut">
               <a:rPr lang="en-US" smtClean="0"/>
-              <a:t>2/24/2023</a:t>
+              <a:t>3/1/2023</a:t>
             </a:fld>
             <a:endParaRPr lang="en-US"/>
           </a:p>
@@ -9394,7 +9101,7 @@
             <a:fld id="{1C2D31DE-C454-491C-B5C3-F097855E3DF7}" type="datetime4">
               <a:rPr lang="en-US" smtClean="0"/>
               <a:pPr/>
-              <a:t>February 24, 2023</a:t>
+              <a:t>March 1, 2023</a:t>
             </a:fld>
             <a:endParaRPr lang="en-US" dirty="0"/>
           </a:p>
@@ -12546,7 +12253,7 @@
           <a:p>
             <a:fld id="{5958763E-B898-436D-883D-03711491D54A}" type="datetimeFigureOut">
               <a:rPr lang="en-US" smtClean="0"/>
-              <a:t>2/24/2023</a:t>
+              <a:t>3/1/2023</a:t>
             </a:fld>
             <a:endParaRPr lang="en-US"/>
           </a:p>
@@ -12670,7 +12377,7 @@
           <a:p>
             <a:fld id="{5958763E-B898-436D-883D-03711491D54A}" type="datetimeFigureOut">
               <a:rPr lang="en-US" smtClean="0"/>
-              <a:t>2/24/2023</a:t>
+              <a:t>3/1/2023</a:t>
             </a:fld>
             <a:endParaRPr lang="en-US"/>
           </a:p>
@@ -12794,7 +12501,7 @@
           <a:p>
             <a:fld id="{5958763E-B898-436D-883D-03711491D54A}" type="datetimeFigureOut">
               <a:rPr lang="en-US" smtClean="0"/>
-              <a:t>2/24/2023</a:t>
+              <a:t>3/1/2023</a:t>
             </a:fld>
             <a:endParaRPr lang="en-US"/>
           </a:p>
@@ -12918,7 +12625,7 @@
           <a:p>
             <a:fld id="{5958763E-B898-436D-883D-03711491D54A}" type="datetimeFigureOut">
               <a:rPr lang="en-US" smtClean="0"/>
-              <a:t>2/24/2023</a:t>
+              <a:t>3/1/2023</a:t>
             </a:fld>
             <a:endParaRPr lang="en-US"/>
           </a:p>
@@ -13042,7 +12749,7 @@
           <a:p>
             <a:fld id="{5958763E-B898-436D-883D-03711491D54A}" type="datetimeFigureOut">
               <a:rPr lang="en-US" smtClean="0"/>
-              <a:t>2/24/2023</a:t>
+              <a:t>3/1/2023</a:t>
             </a:fld>
             <a:endParaRPr lang="en-US"/>
           </a:p>
@@ -13166,7 +12873,7 @@
           <a:p>
             <a:fld id="{5958763E-B898-436D-883D-03711491D54A}" type="datetimeFigureOut">
               <a:rPr lang="en-US" smtClean="0"/>
-              <a:t>2/24/2023</a:t>
+              <a:t>3/1/2023</a:t>
             </a:fld>
             <a:endParaRPr lang="en-US"/>
           </a:p>
@@ -13290,7 +12997,7 @@
           <a:p>
             <a:fld id="{5958763E-B898-436D-883D-03711491D54A}" type="datetimeFigureOut">
               <a:rPr lang="en-US" smtClean="0"/>
-              <a:t>2/24/2023</a:t>
+              <a:t>3/1/2023</a:t>
             </a:fld>
             <a:endParaRPr lang="en-US"/>
           </a:p>
@@ -13414,7 +13121,7 @@
           <a:p>
             <a:fld id="{5958763E-B898-436D-883D-03711491D54A}" type="datetimeFigureOut">
               <a:rPr lang="en-US" smtClean="0"/>
-              <a:t>2/24/2023</a:t>
+              <a:t>3/1/2023</a:t>
             </a:fld>
             <a:endParaRPr lang="en-US"/>
           </a:p>
@@ -13547,7 +13254,7 @@
           <a:p>
             <a:fld id="{5958763E-B898-436D-883D-03711491D54A}" type="datetimeFigureOut">
               <a:rPr lang="en-US" smtClean="0"/>
-              <a:t>2/24/2023</a:t>
+              <a:t>3/1/2023</a:t>
             </a:fld>
             <a:endParaRPr lang="en-US"/>
           </a:p>
@@ -16886,7 +16593,7 @@
             <a:fld id="{1C2D31DE-C454-491C-B5C3-F097855E3DF7}" type="datetime4">
               <a:rPr lang="en-US" smtClean="0"/>
               <a:pPr/>
-              <a:t>February 24, 2023</a:t>
+              <a:t>March 1, 2023</a:t>
             </a:fld>
             <a:endParaRPr lang="en-US" dirty="0"/>
           </a:p>
@@ -29122,7 +28829,7 @@
           <a:p>
             <a:fld id="{5958763E-B898-436D-883D-03711491D54A}" type="datetimeFigureOut">
               <a:rPr lang="en-US" smtClean="0"/>
-              <a:t>2/24/2023</a:t>
+              <a:t>3/1/2023</a:t>
             </a:fld>
             <a:endParaRPr lang="en-US"/>
           </a:p>
@@ -29524,7 +29231,7 @@
           <a:p>
             <a:fld id="{5958763E-B898-436D-883D-03711491D54A}" type="datetimeFigureOut">
               <a:rPr lang="en-US" smtClean="0"/>
-              <a:t>2/24/2023</a:t>
+              <a:t>3/1/2023</a:t>
             </a:fld>
             <a:endParaRPr lang="en-US"/>
           </a:p>
@@ -29818,7 +29525,7 @@
           <a:p>
             <a:fld id="{5958763E-B898-436D-883D-03711491D54A}" type="datetimeFigureOut">
               <a:rPr lang="en-US" smtClean="0"/>
-              <a:t>2/24/2023</a:t>
+              <a:t>3/1/2023</a:t>
             </a:fld>
             <a:endParaRPr lang="en-US"/>
           </a:p>
@@ -30019,7 +29726,7 @@
           <a:p>
             <a:fld id="{5958763E-B898-436D-883D-03711491D54A}" type="datetimeFigureOut">
               <a:rPr lang="en-US" smtClean="0"/>
-              <a:t>2/24/2023</a:t>
+              <a:t>3/1/2023</a:t>
             </a:fld>
             <a:endParaRPr lang="en-US"/>
           </a:p>
@@ -30280,7 +29987,7 @@
           <a:p>
             <a:fld id="{5958763E-B898-436D-883D-03711491D54A}" type="datetimeFigureOut">
               <a:rPr lang="en-US" smtClean="0"/>
-              <a:t>2/24/2023</a:t>
+              <a:t>3/1/2023</a:t>
             </a:fld>
             <a:endParaRPr lang="en-US"/>
           </a:p>
@@ -30788,7 +30495,7 @@
           <a:p>
             <a:fld id="{5958763E-B898-436D-883D-03711491D54A}" type="datetimeFigureOut">
               <a:rPr lang="en-US" smtClean="0"/>
-              <a:t>2/24/2023</a:t>
+              <a:t>3/1/2023</a:t>
             </a:fld>
             <a:endParaRPr lang="en-US"/>
           </a:p>
@@ -31267,7 +30974,7 @@
           <a:p>
             <a:fld id="{5958763E-B898-436D-883D-03711491D54A}" type="datetimeFigureOut">
               <a:rPr lang="en-US" smtClean="0"/>
-              <a:t>2/24/2023</a:t>
+              <a:t>3/1/2023</a:t>
             </a:fld>
             <a:endParaRPr lang="en-US"/>
           </a:p>
@@ -32086,7 +31793,7 @@
           <a:p>
             <a:fld id="{5958763E-B898-436D-883D-03711491D54A}" type="datetimeFigureOut">
               <a:rPr lang="en-US" smtClean="0"/>
-              <a:t>2/24/2023</a:t>
+              <a:t>3/1/2023</a:t>
             </a:fld>
             <a:endParaRPr lang="en-US"/>
           </a:p>
@@ -32287,7 +31994,7 @@
           <a:p>
             <a:fld id="{5958763E-B898-436D-883D-03711491D54A}" type="datetimeFigureOut">
               <a:rPr lang="en-US" smtClean="0"/>
-              <a:t>2/24/2023</a:t>
+              <a:t>3/1/2023</a:t>
             </a:fld>
             <a:endParaRPr lang="en-US"/>
           </a:p>
@@ -32622,7 +32329,7 @@
           <a:p>
             <a:fld id="{5958763E-B898-436D-883D-03711491D54A}" type="datetimeFigureOut">
               <a:rPr lang="en-US" smtClean="0"/>
-              <a:t>2/24/2023</a:t>
+              <a:t>3/1/2023</a:t>
             </a:fld>
             <a:endParaRPr lang="en-US"/>
           </a:p>
@@ -32852,7 +32559,7 @@
           <a:p>
             <a:fld id="{5958763E-B898-436D-883D-03711491D54A}" type="datetimeFigureOut">
               <a:rPr lang="en-US" smtClean="0"/>
-              <a:t>2/24/2023</a:t>
+              <a:t>3/1/2023</a:t>
             </a:fld>
             <a:endParaRPr lang="en-US"/>
           </a:p>
@@ -33096,7 +32803,7 @@
           <a:p>
             <a:fld id="{5958763E-B898-436D-883D-03711491D54A}" type="datetimeFigureOut">
               <a:rPr lang="en-US" smtClean="0"/>
-              <a:t>2/24/2023</a:t>
+              <a:t>3/1/2023</a:t>
             </a:fld>
             <a:endParaRPr lang="en-US"/>
           </a:p>
@@ -36695,6 +36402,17 @@
             <a:pPr marL="57150" indent="0">
               <a:buNone/>
             </a:pPr>
+            <a:endParaRPr lang="en-US" sz="3600" dirty="0">
+              <a:solidFill>
+                <a:srgbClr val="569CD6"/>
+              </a:solidFill>
+              <a:latin typeface="Consolas" panose="020B0609020204030204" pitchFamily="49" charset="0"/>
+            </a:endParaRPr>
+          </a:p>
+          <a:p>
+            <a:pPr marL="57150" indent="0">
+              <a:buNone/>
+            </a:pPr>
             <a:r>
               <a:rPr lang="en-US" sz="3600" dirty="0">
                 <a:solidFill>
@@ -36838,46 +36556,6 @@
               <a:latin typeface="Consolas" panose="020B0609020204030204" pitchFamily="49" charset="0"/>
             </a:endParaRPr>
           </a:p>
-          <a:p>
-            <a:pPr marL="57150" indent="0">
-              <a:buNone/>
-            </a:pPr>
-            <a:r>
-              <a:rPr lang="en-US" sz="3200" i="1" dirty="0">
-                <a:solidFill>
-                  <a:srgbClr val="FFC000"/>
-                </a:solidFill>
-              </a:rPr>
-              <a:t>Fork this Repl project, and copy the code above to try it!</a:t>
-            </a:r>
-          </a:p>
-          <a:p>
-            <a:pPr marL="57150" indent="0">
-              <a:buNone/>
-            </a:pPr>
-            <a:r>
-              <a:rPr lang="en-US" sz="3600" b="1" dirty="0">
-                <a:solidFill>
-                  <a:schemeClr val="bg1"/>
-                </a:solidFill>
-                <a:latin typeface="Consolas" panose="020B0609020204030204" pitchFamily="49" charset="0"/>
-                <a:hlinkClick r:id="rId3">
-                  <a:extLst>
-                    <a:ext uri="{A12FA001-AC4F-418D-AE19-62706E023703}">
-                      <ahyp:hlinkClr xmlns:ahyp="http://schemas.microsoft.com/office/drawing/2018/hyperlinkcolor" val="tx"/>
-                    </a:ext>
-                  </a:extLst>
-                </a:hlinkClick>
-              </a:rPr>
-              <a:t>replit.com/@HylandOutreach/JavaScriptStarter</a:t>
-            </a:r>
-            <a:endParaRPr lang="en-US" sz="3600" b="1" dirty="0">
-              <a:solidFill>
-                <a:schemeClr val="bg1"/>
-              </a:solidFill>
-              <a:latin typeface="Consolas" panose="020B0609020204030204" pitchFamily="49" charset="0"/>
-            </a:endParaRPr>
-          </a:p>
         </p:txBody>
       </p:sp>
     </p:spTree>
@@ -36897,364 +36575,6 @@
 </file>
 
 <file path=ppt/slides/slide11.xml><?xml version="1.0" encoding="utf-8"?>
-<p:sld xmlns:a="http://schemas.openxmlformats.org/drawingml/2006/main" xmlns:r="http://schemas.openxmlformats.org/officeDocument/2006/relationships" xmlns:p="http://schemas.openxmlformats.org/presentationml/2006/main">
-  <p:cSld>
-    <p:bg>
-      <p:bgPr>
-        <a:solidFill>
-          <a:schemeClr val="tx1">
-            <a:lumMod val="50000"/>
-          </a:schemeClr>
-        </a:solidFill>
-        <a:effectLst/>
-      </p:bgPr>
-    </p:bg>
-    <p:spTree>
-      <p:nvGrpSpPr>
-        <p:cNvPr id="1" name=""/>
-        <p:cNvGrpSpPr/>
-        <p:nvPr/>
-      </p:nvGrpSpPr>
-      <p:grpSpPr>
-        <a:xfrm>
-          <a:off x="0" y="0"/>
-          <a:ext cx="0" cy="0"/>
-          <a:chOff x="0" y="0"/>
-          <a:chExt cx="0" cy="0"/>
-        </a:xfrm>
-      </p:grpSpPr>
-      <p:sp>
-        <p:nvSpPr>
-          <p:cNvPr id="2" name="Title 1"/>
-          <p:cNvSpPr>
-            <a:spLocks noGrp="1"/>
-          </p:cNvSpPr>
-          <p:nvPr>
-            <p:ph type="title"/>
-          </p:nvPr>
-        </p:nvSpPr>
-        <p:spPr/>
-        <p:txBody>
-          <a:bodyPr/>
-          <a:lstStyle/>
-          <a:p>
-            <a:r>
-              <a:rPr lang="en-US"/>
-              <a:t>Variables </a:t>
-            </a:r>
-            <a:r>
-              <a:rPr lang="en-US" dirty="0"/>
-              <a:t>example</a:t>
-            </a:r>
-          </a:p>
-        </p:txBody>
-      </p:sp>
-      <p:sp>
-        <p:nvSpPr>
-          <p:cNvPr id="3" name="Content Placeholder 2"/>
-          <p:cNvSpPr>
-            <a:spLocks noGrp="1"/>
-          </p:cNvSpPr>
-          <p:nvPr>
-            <p:ph idx="1"/>
-          </p:nvPr>
-        </p:nvSpPr>
-        <p:spPr/>
-        <p:txBody>
-          <a:bodyPr>
-            <a:noAutofit/>
-          </a:bodyPr>
-          <a:lstStyle/>
-          <a:p>
-            <a:pPr marL="57150" indent="0">
-              <a:buNone/>
-            </a:pPr>
-            <a:r>
-              <a:rPr lang="en-US" sz="8800" dirty="0">
-                <a:hlinkClick r:id="rId3"/>
-              </a:rPr>
-              <a:t>https://replit.com/@HylandOutreach/PromptAlert#script.js</a:t>
-            </a:r>
-            <a:endParaRPr lang="en-US" sz="9600" dirty="0"/>
-          </a:p>
-        </p:txBody>
-      </p:sp>
-    </p:spTree>
-    <p:extLst>
-      <p:ext uri="{BB962C8B-B14F-4D97-AF65-F5344CB8AC3E}">
-        <p14:creationId xmlns:p14="http://schemas.microsoft.com/office/powerpoint/2010/main" val="1235215060"/>
-      </p:ext>
-    </p:extLst>
-  </p:cSld>
-  <p:clrMapOvr>
-    <a:masterClrMapping/>
-  </p:clrMapOvr>
-  <p:transition>
-    <p:fade/>
-  </p:transition>
-</p:sld>
-</file>
-
-<file path=ppt/slides/slide12.xml><?xml version="1.0" encoding="utf-8"?>
-<p:sld xmlns:a="http://schemas.openxmlformats.org/drawingml/2006/main" xmlns:r="http://schemas.openxmlformats.org/officeDocument/2006/relationships" xmlns:p="http://schemas.openxmlformats.org/presentationml/2006/main">
-  <p:cSld>
-    <p:spTree>
-      <p:nvGrpSpPr>
-        <p:cNvPr id="1" name=""/>
-        <p:cNvGrpSpPr/>
-        <p:nvPr/>
-      </p:nvGrpSpPr>
-      <p:grpSpPr>
-        <a:xfrm>
-          <a:off x="0" y="0"/>
-          <a:ext cx="0" cy="0"/>
-          <a:chOff x="0" y="0"/>
-          <a:chExt cx="0" cy="0"/>
-        </a:xfrm>
-      </p:grpSpPr>
-      <p:sp>
-        <p:nvSpPr>
-          <p:cNvPr id="2" name="Title 1"/>
-          <p:cNvSpPr>
-            <a:spLocks noGrp="1"/>
-          </p:cNvSpPr>
-          <p:nvPr>
-            <p:ph type="title"/>
-          </p:nvPr>
-        </p:nvSpPr>
-        <p:spPr/>
-        <p:txBody>
-          <a:bodyPr/>
-          <a:lstStyle/>
-          <a:p>
-            <a:r>
-              <a:rPr lang="en-US" dirty="0"/>
-              <a:t>Mini-challenge</a:t>
-            </a:r>
-          </a:p>
-        </p:txBody>
-      </p:sp>
-      <p:sp>
-        <p:nvSpPr>
-          <p:cNvPr id="3" name="Content Placeholder 2"/>
-          <p:cNvSpPr>
-            <a:spLocks noGrp="1"/>
-          </p:cNvSpPr>
-          <p:nvPr>
-            <p:ph idx="1"/>
-          </p:nvPr>
-        </p:nvSpPr>
-        <p:spPr/>
-        <p:txBody>
-          <a:bodyPr anchor="ctr"/>
-          <a:lstStyle/>
-          <a:p>
-            <a:pPr marL="0" indent="0" algn="ctr">
-              <a:buNone/>
-            </a:pPr>
-            <a:r>
-              <a:rPr lang="en-US" sz="6000" dirty="0"/>
-              <a:t>Write a program that asks the user for their name, and says hello to them.</a:t>
-            </a:r>
-          </a:p>
-          <a:p>
-            <a:pPr marL="57150" indent="0">
-              <a:buNone/>
-            </a:pPr>
-            <a:endParaRPr lang="en-US" dirty="0"/>
-          </a:p>
-          <a:p>
-            <a:pPr marL="57150" indent="0" algn="ctr">
-              <a:buNone/>
-            </a:pPr>
-            <a:r>
-              <a:rPr lang="en-US" sz="4400" dirty="0">
-                <a:solidFill>
-                  <a:schemeClr val="accent1">
-                    <a:lumMod val="50000"/>
-                  </a:schemeClr>
-                </a:solidFill>
-              </a:rPr>
-              <a:t>For example, if the user enters “Charlie”, it should say “Hello, Charlie!”</a:t>
-            </a:r>
-          </a:p>
-          <a:p>
-            <a:pPr marL="57150" indent="0" algn="ctr">
-              <a:buNone/>
-            </a:pPr>
-            <a:endParaRPr lang="en-US" sz="4400" dirty="0">
-              <a:solidFill>
-                <a:schemeClr val="accent1">
-                  <a:lumMod val="50000"/>
-                </a:schemeClr>
-              </a:solidFill>
-            </a:endParaRPr>
-          </a:p>
-        </p:txBody>
-      </p:sp>
-    </p:spTree>
-    <p:extLst>
-      <p:ext uri="{BB962C8B-B14F-4D97-AF65-F5344CB8AC3E}">
-        <p14:creationId xmlns:p14="http://schemas.microsoft.com/office/powerpoint/2010/main" val="1897140388"/>
-      </p:ext>
-    </p:extLst>
-  </p:cSld>
-  <p:clrMapOvr>
-    <a:masterClrMapping/>
-  </p:clrMapOvr>
-  <p:transition>
-    <p:fade/>
-  </p:transition>
-</p:sld>
-</file>
-
-<file path=ppt/slides/slide13.xml><?xml version="1.0" encoding="utf-8"?>
-<p:sld xmlns:a="http://schemas.openxmlformats.org/drawingml/2006/main" xmlns:r="http://schemas.openxmlformats.org/officeDocument/2006/relationships" xmlns:p="http://schemas.openxmlformats.org/presentationml/2006/main">
-  <p:cSld>
-    <p:spTree>
-      <p:nvGrpSpPr>
-        <p:cNvPr id="1" name=""/>
-        <p:cNvGrpSpPr/>
-        <p:nvPr/>
-      </p:nvGrpSpPr>
-      <p:grpSpPr>
-        <a:xfrm>
-          <a:off x="0" y="0"/>
-          <a:ext cx="0" cy="0"/>
-          <a:chOff x="0" y="0"/>
-          <a:chExt cx="0" cy="0"/>
-        </a:xfrm>
-      </p:grpSpPr>
-      <p:sp>
-        <p:nvSpPr>
-          <p:cNvPr id="2" name="Title 1"/>
-          <p:cNvSpPr>
-            <a:spLocks noGrp="1"/>
-          </p:cNvSpPr>
-          <p:nvPr>
-            <p:ph type="title"/>
-          </p:nvPr>
-        </p:nvSpPr>
-        <p:spPr/>
-        <p:txBody>
-          <a:bodyPr/>
-          <a:lstStyle/>
-          <a:p>
-            <a:r>
-              <a:rPr lang="en-US" dirty="0"/>
-              <a:t>Solution</a:t>
-            </a:r>
-          </a:p>
-        </p:txBody>
-      </p:sp>
-      <p:sp>
-        <p:nvSpPr>
-          <p:cNvPr id="3" name="Content Placeholder 2"/>
-          <p:cNvSpPr>
-            <a:spLocks noGrp="1"/>
-          </p:cNvSpPr>
-          <p:nvPr>
-            <p:ph idx="1"/>
-          </p:nvPr>
-        </p:nvSpPr>
-        <p:spPr/>
-        <p:txBody>
-          <a:bodyPr anchor="ctr">
-            <a:normAutofit/>
-          </a:bodyPr>
-          <a:lstStyle/>
-          <a:p>
-            <a:pPr marL="0" indent="0">
-              <a:buNone/>
-            </a:pPr>
-            <a:r>
-              <a:rPr lang="en-US" sz="4000" dirty="0">
-                <a:solidFill>
-                  <a:srgbClr val="0000FF"/>
-                </a:solidFill>
-                <a:latin typeface="Consolas" panose="020B0609020204030204" pitchFamily="49" charset="0"/>
-              </a:rPr>
-              <a:t>let</a:t>
-            </a:r>
-            <a:r>
-              <a:rPr lang="en-US" sz="4000" dirty="0">
-                <a:solidFill>
-                  <a:srgbClr val="000000"/>
-                </a:solidFill>
-                <a:latin typeface="Consolas" panose="020B0609020204030204" pitchFamily="49" charset="0"/>
-              </a:rPr>
-              <a:t> name = prompt(</a:t>
-            </a:r>
-            <a:r>
-              <a:rPr lang="en-US" sz="4000" dirty="0">
-                <a:solidFill>
-                  <a:srgbClr val="A31515"/>
-                </a:solidFill>
-                <a:latin typeface="Consolas" panose="020B0609020204030204" pitchFamily="49" charset="0"/>
-              </a:rPr>
-              <a:t>"What is your name?"</a:t>
-            </a:r>
-            <a:r>
-              <a:rPr lang="en-US" sz="4000" dirty="0">
-                <a:solidFill>
-                  <a:srgbClr val="000000"/>
-                </a:solidFill>
-                <a:latin typeface="Consolas" panose="020B0609020204030204" pitchFamily="49" charset="0"/>
-              </a:rPr>
-              <a:t>);</a:t>
-            </a:r>
-          </a:p>
-          <a:p>
-            <a:pPr marL="0" indent="0">
-              <a:buNone/>
-            </a:pPr>
-            <a:r>
-              <a:rPr lang="en-US" sz="4000" dirty="0">
-                <a:solidFill>
-                  <a:srgbClr val="000000"/>
-                </a:solidFill>
-                <a:latin typeface="Consolas" panose="020B0609020204030204" pitchFamily="49" charset="0"/>
-              </a:rPr>
-              <a:t>alert(</a:t>
-            </a:r>
-            <a:r>
-              <a:rPr lang="en-US" sz="4000" dirty="0">
-                <a:solidFill>
-                  <a:srgbClr val="A31515"/>
-                </a:solidFill>
-                <a:latin typeface="Consolas" panose="020B0609020204030204" pitchFamily="49" charset="0"/>
-              </a:rPr>
-              <a:t>"Hello, "</a:t>
-            </a:r>
-            <a:r>
-              <a:rPr lang="en-US" sz="4000" dirty="0">
-                <a:solidFill>
-                  <a:srgbClr val="000000"/>
-                </a:solidFill>
-                <a:latin typeface="Consolas" panose="020B0609020204030204" pitchFamily="49" charset="0"/>
-              </a:rPr>
-              <a:t> + name);</a:t>
-            </a:r>
-          </a:p>
-        </p:txBody>
-      </p:sp>
-    </p:spTree>
-    <p:extLst>
-      <p:ext uri="{BB962C8B-B14F-4D97-AF65-F5344CB8AC3E}">
-        <p14:creationId xmlns:p14="http://schemas.microsoft.com/office/powerpoint/2010/main" val="3996834524"/>
-      </p:ext>
-    </p:extLst>
-  </p:cSld>
-  <p:clrMapOvr>
-    <a:masterClrMapping/>
-  </p:clrMapOvr>
-  <p:transition>
-    <p:fade/>
-  </p:transition>
-</p:sld>
-</file>
-
-<file path=ppt/slides/slide14.xml><?xml version="1.0" encoding="utf-8"?>
 <p:sld xmlns:a="http://schemas.openxmlformats.org/drawingml/2006/main" xmlns:r="http://schemas.openxmlformats.org/officeDocument/2006/relationships" xmlns:p="http://schemas.openxmlformats.org/presentationml/2006/main">
   <p:cSld>
     <p:spTree>
@@ -37391,9 +36711,9 @@
             </a:r>
           </a:p>
           <a:p>
-            <a:endParaRPr lang="en-US" dirty="0"/>
-          </a:p>
-          <a:p>
+            <a:pPr marL="57150" indent="0">
+              <a:buNone/>
+            </a:pPr>
             <a:endParaRPr lang="en-US" dirty="0"/>
           </a:p>
           <a:p>
@@ -37428,7 +36748,14 @@
             <a:pPr lvl="1"/>
             <a:r>
               <a:rPr lang="en-US" sz="2800" dirty="0"/>
-              <a:t>Messages/notifications</a:t>
+              <a:t>Messages and notifications</a:t>
+            </a:r>
+          </a:p>
+          <a:p>
+            <a:pPr lvl="1"/>
+            <a:r>
+              <a:rPr lang="en-US" sz="2800" dirty="0"/>
+              <a:t>Comments and likes</a:t>
             </a:r>
           </a:p>
           <a:p>
@@ -37607,7 +36934,7 @@
                                         <p:tgtEl>
                                           <p:spTgt spid="3">
                                             <p:txEl>
-                                              <p:pRg st="4" end="4"/>
+                                              <p:pRg st="3" end="3"/>
                                             </p:txEl>
                                           </p:spTgt>
                                         </p:tgtEl>
@@ -37625,7 +36952,7 @@
                                         <p:tgtEl>
                                           <p:spTgt spid="3">
                                             <p:txEl>
-                                              <p:pRg st="4" end="4"/>
+                                              <p:pRg st="3" end="3"/>
                                             </p:txEl>
                                           </p:spTgt>
                                         </p:tgtEl>
@@ -37668,7 +36995,7 @@
                                         <p:tgtEl>
                                           <p:spTgt spid="3">
                                             <p:txEl>
-                                              <p:pRg st="5" end="5"/>
+                                              <p:pRg st="4" end="4"/>
                                             </p:txEl>
                                           </p:spTgt>
                                         </p:tgtEl>
@@ -37686,7 +37013,7 @@
                                         <p:tgtEl>
                                           <p:spTgt spid="3">
                                             <p:txEl>
-                                              <p:pRg st="5" end="5"/>
+                                              <p:pRg st="4" end="4"/>
                                             </p:txEl>
                                           </p:spTgt>
                                         </p:tgtEl>
@@ -37729,7 +37056,7 @@
                                         <p:tgtEl>
                                           <p:spTgt spid="3">
                                             <p:txEl>
-                                              <p:pRg st="6" end="6"/>
+                                              <p:pRg st="5" end="5"/>
                                             </p:txEl>
                                           </p:spTgt>
                                         </p:tgtEl>
@@ -37747,7 +37074,7 @@
                                         <p:tgtEl>
                                           <p:spTgt spid="3">
                                             <p:txEl>
-                                              <p:pRg st="6" end="6"/>
+                                              <p:pRg st="5" end="5"/>
                                             </p:txEl>
                                           </p:spTgt>
                                         </p:tgtEl>
@@ -37790,6 +37117,67 @@
                                         <p:tgtEl>
                                           <p:spTgt spid="3">
                                             <p:txEl>
+                                              <p:pRg st="6" end="6"/>
+                                            </p:txEl>
+                                          </p:spTgt>
+                                        </p:tgtEl>
+                                        <p:attrNameLst>
+                                          <p:attrName>style.visibility</p:attrName>
+                                        </p:attrNameLst>
+                                      </p:cBhvr>
+                                      <p:to>
+                                        <p:strVal val="visible"/>
+                                      </p:to>
+                                    </p:set>
+                                    <p:animEffect transition="in" filter="fade">
+                                      <p:cBhvr>
+                                        <p:cTn id="32" dur="500"/>
+                                        <p:tgtEl>
+                                          <p:spTgt spid="3">
+                                            <p:txEl>
+                                              <p:pRg st="6" end="6"/>
+                                            </p:txEl>
+                                          </p:spTgt>
+                                        </p:tgtEl>
+                                      </p:cBhvr>
+                                    </p:animEffect>
+                                  </p:childTnLst>
+                                </p:cTn>
+                              </p:par>
+                            </p:childTnLst>
+                          </p:cTn>
+                        </p:par>
+                      </p:childTnLst>
+                    </p:cTn>
+                  </p:par>
+                  <p:par>
+                    <p:cTn id="33" fill="hold">
+                      <p:stCondLst>
+                        <p:cond delay="indefinite"/>
+                      </p:stCondLst>
+                      <p:childTnLst>
+                        <p:par>
+                          <p:cTn id="34" fill="hold">
+                            <p:stCondLst>
+                              <p:cond delay="0"/>
+                            </p:stCondLst>
+                            <p:childTnLst>
+                              <p:par>
+                                <p:cTn id="35" presetID="10" presetClass="entr" presetSubtype="0" fill="hold" grpId="0" nodeType="clickEffect">
+                                  <p:stCondLst>
+                                    <p:cond delay="0"/>
+                                  </p:stCondLst>
+                                  <p:childTnLst>
+                                    <p:set>
+                                      <p:cBhvr>
+                                        <p:cTn id="36" dur="1" fill="hold">
+                                          <p:stCondLst>
+                                            <p:cond delay="0"/>
+                                          </p:stCondLst>
+                                        </p:cTn>
+                                        <p:tgtEl>
+                                          <p:spTgt spid="3">
+                                            <p:txEl>
                                               <p:pRg st="7" end="7"/>
                                             </p:txEl>
                                           </p:spTgt>
@@ -37804,7 +37192,7 @@
                                     </p:set>
                                     <p:animEffect transition="in" filter="fade">
                                       <p:cBhvr>
-                                        <p:cTn id="32" dur="500"/>
+                                        <p:cTn id="37" dur="500"/>
                                         <p:tgtEl>
                                           <p:spTgt spid="3">
                                             <p:txEl>
@@ -37900,10 +37288,15 @@
             <p:ph idx="1"/>
           </p:nvPr>
         </p:nvSpPr>
-        <p:spPr/>
+        <p:spPr>
+          <a:xfrm>
+            <a:off x="381000" y="1371600"/>
+            <a:ext cx="11430000" cy="5029200"/>
+          </a:xfrm>
+        </p:spPr>
         <p:txBody>
           <a:bodyPr>
-            <a:normAutofit fontScale="92500" lnSpcReduction="20000"/>
+            <a:normAutofit fontScale="85000" lnSpcReduction="20000"/>
           </a:bodyPr>
           <a:lstStyle/>
           <a:p>
@@ -41310,9 +40703,20 @@
         <p:spPr/>
         <p:txBody>
           <a:bodyPr>
-            <a:normAutofit/>
+            <a:normAutofit lnSpcReduction="10000"/>
           </a:bodyPr>
           <a:lstStyle/>
+          <a:p>
+            <a:pPr marL="0" indent="0">
+              <a:buNone/>
+            </a:pPr>
+            <a:endParaRPr lang="en-US" sz="4000" dirty="0">
+              <a:solidFill>
+                <a:srgbClr val="000000"/>
+              </a:solidFill>
+              <a:latin typeface="Consolas" panose="020B0609020204030204" pitchFamily="49" charset="0"/>
+            </a:endParaRPr>
+          </a:p>
           <a:p>
             <a:pPr marL="0" indent="0">
               <a:buNone/>
@@ -41344,11 +40748,6 @@
               </a:rPr>
               <a:t>);</a:t>
             </a:r>
-          </a:p>
-          <a:p>
-            <a:pPr marL="0" indent="0">
-              <a:buNone/>
-            </a:pPr>
             <a:endParaRPr lang="en-US" dirty="0">
               <a:solidFill>
                 <a:srgbClr val="000000"/>
@@ -41469,7 +40868,7 @@
                                         <p:tgtEl>
                                           <p:spTgt spid="3">
                                             <p:txEl>
-                                              <p:pRg st="0" end="0"/>
+                                              <p:pRg st="1" end="1"/>
                                             </p:txEl>
                                           </p:spTgt>
                                         </p:tgtEl>
@@ -41487,7 +40886,7 @@
                                         <p:tgtEl>
                                           <p:spTgt spid="3">
                                             <p:txEl>
-                                              <p:pRg st="0" end="0"/>
+                                              <p:pRg st="1" end="1"/>
                                             </p:txEl>
                                           </p:spTgt>
                                         </p:tgtEl>

</xml_diff>

<commit_message>
Update gitbook 2025-01-22 21:35:55
</commit_message>
<xml_diff>
--- a/IntroToJS/JavaScriptVariables.pptx
+++ b/IntroToJS/JavaScriptVariables.pptx
@@ -5,7 +5,7 @@
     <p:sldMasterId id="2147483648" r:id="rId1"/>
   </p:sldMasterIdLst>
   <p:notesMasterIdLst>
-    <p:notesMasterId r:id="rId13"/>
+    <p:notesMasterId r:id="rId14"/>
   </p:notesMasterIdLst>
   <p:sldIdLst>
     <p:sldId id="258" r:id="rId2"/>
@@ -18,7 +18,8 @@
     <p:sldId id="320" r:id="rId9"/>
     <p:sldId id="321" r:id="rId10"/>
     <p:sldId id="322" r:id="rId11"/>
-    <p:sldId id="326" r:id="rId12"/>
+    <p:sldId id="329" r:id="rId12"/>
+    <p:sldId id="326" r:id="rId13"/>
   </p:sldIdLst>
   <p:sldSz cx="12192000" cy="6858000"/>
   <p:notesSz cx="6858000" cy="9144000"/>
@@ -218,7 +219,7 @@
           <a:p>
             <a:fld id="{19104133-B5B0-4351-8158-4F0E5EB1E2BF}" type="datetimeFigureOut">
               <a:rPr lang="en-US" smtClean="0"/>
-              <a:t>3/1/2023</a:t>
+              <a:t>1/22/2025</a:t>
             </a:fld>
             <a:endParaRPr lang="en-US"/>
           </a:p>
@@ -585,6 +586,138 @@
 </p:notes>
 </file>
 
+<file path=ppt/notesSlides/notesSlide10.xml><?xml version="1.0" encoding="utf-8"?>
+<p:notes xmlns:a="http://schemas.openxmlformats.org/drawingml/2006/main" xmlns:r="http://schemas.openxmlformats.org/officeDocument/2006/relationships" xmlns:p="http://schemas.openxmlformats.org/presentationml/2006/main">
+  <p:cSld>
+    <p:spTree>
+      <p:nvGrpSpPr>
+        <p:cNvPr id="1" name="">
+          <a:extLst>
+            <a:ext uri="{FF2B5EF4-FFF2-40B4-BE49-F238E27FC236}">
+              <a16:creationId xmlns:a16="http://schemas.microsoft.com/office/drawing/2014/main" id="{4B2E80D3-BE97-4255-3DA1-1F576FA474AA}"/>
+            </a:ext>
+          </a:extLst>
+        </p:cNvPr>
+        <p:cNvGrpSpPr/>
+        <p:nvPr/>
+      </p:nvGrpSpPr>
+      <p:grpSpPr>
+        <a:xfrm>
+          <a:off x="0" y="0"/>
+          <a:ext cx="0" cy="0"/>
+          <a:chOff x="0" y="0"/>
+          <a:chExt cx="0" cy="0"/>
+        </a:xfrm>
+      </p:grpSpPr>
+      <p:sp>
+        <p:nvSpPr>
+          <p:cNvPr id="2" name="Slide Image Placeholder 1">
+            <a:extLst>
+              <a:ext uri="{FF2B5EF4-FFF2-40B4-BE49-F238E27FC236}">
+                <a16:creationId xmlns:a16="http://schemas.microsoft.com/office/drawing/2014/main" id="{E303E371-8BC8-B873-9B89-8A1F23F1163A}"/>
+              </a:ext>
+            </a:extLst>
+          </p:cNvPr>
+          <p:cNvSpPr>
+            <a:spLocks noGrp="1" noRot="1" noChangeAspect="1"/>
+          </p:cNvSpPr>
+          <p:nvPr>
+            <p:ph type="sldImg"/>
+          </p:nvPr>
+        </p:nvSpPr>
+        <p:spPr/>
+      </p:sp>
+      <p:sp>
+        <p:nvSpPr>
+          <p:cNvPr id="3" name="Notes Placeholder 2">
+            <a:extLst>
+              <a:ext uri="{FF2B5EF4-FFF2-40B4-BE49-F238E27FC236}">
+                <a16:creationId xmlns:a16="http://schemas.microsoft.com/office/drawing/2014/main" id="{0F872808-7E59-7DDF-7B7F-E20CC35BAFEB}"/>
+              </a:ext>
+            </a:extLst>
+          </p:cNvPr>
+          <p:cNvSpPr>
+            <a:spLocks noGrp="1"/>
+          </p:cNvSpPr>
+          <p:nvPr>
+            <p:ph type="body" idx="1"/>
+          </p:nvPr>
+        </p:nvSpPr>
+        <p:spPr/>
+        <p:txBody>
+          <a:bodyPr/>
+          <a:lstStyle/>
+          <a:p>
+            <a:r>
+              <a:rPr lang="en-US" dirty="0"/>
+              <a:t>For the </a:t>
+            </a:r>
+            <a:r>
+              <a:rPr lang="en-US" dirty="0" err="1"/>
+              <a:t>Repl</a:t>
+            </a:r>
+            <a:r>
+              <a:rPr lang="en-US" dirty="0"/>
+              <a:t>,</a:t>
+            </a:r>
+            <a:r>
+              <a:rPr lang="en-US" baseline="0" dirty="0"/>
+              <a:t> show how the variable is declared, set, and set again. The </a:t>
+            </a:r>
+            <a:r>
+              <a:rPr lang="en-US" i="1" baseline="0" dirty="0"/>
+              <a:t>value</a:t>
+            </a:r>
+            <a:r>
+              <a:rPr lang="en-US" i="0" baseline="0" dirty="0"/>
+              <a:t> changes based on the code.</a:t>
+            </a:r>
+            <a:endParaRPr lang="en-US" baseline="0" dirty="0"/>
+          </a:p>
+        </p:txBody>
+      </p:sp>
+      <p:sp>
+        <p:nvSpPr>
+          <p:cNvPr id="4" name="Slide Number Placeholder 3">
+            <a:extLst>
+              <a:ext uri="{FF2B5EF4-FFF2-40B4-BE49-F238E27FC236}">
+                <a16:creationId xmlns:a16="http://schemas.microsoft.com/office/drawing/2014/main" id="{2700E7C0-A56E-0A30-5E9D-86F5B06A9E41}"/>
+              </a:ext>
+            </a:extLst>
+          </p:cNvPr>
+          <p:cNvSpPr>
+            <a:spLocks noGrp="1"/>
+          </p:cNvSpPr>
+          <p:nvPr>
+            <p:ph type="sldNum" sz="quarter" idx="10"/>
+          </p:nvPr>
+        </p:nvSpPr>
+        <p:spPr/>
+        <p:txBody>
+          <a:bodyPr/>
+          <a:lstStyle/>
+          <a:p>
+            <a:fld id="{DEC8F7F9-57EC-49CF-9FCD-2B781E4B449F}" type="slidenum">
+              <a:rPr lang="en-US" smtClean="0"/>
+              <a:t>11</a:t>
+            </a:fld>
+            <a:endParaRPr lang="en-US"/>
+          </a:p>
+        </p:txBody>
+      </p:sp>
+    </p:spTree>
+    <p:extLst>
+      <p:ext uri="{BB962C8B-B14F-4D97-AF65-F5344CB8AC3E}">
+        <p14:creationId xmlns:p14="http://schemas.microsoft.com/office/powerpoint/2010/main" val="4110409660"/>
+      </p:ext>
+    </p:extLst>
+  </p:cSld>
+  <p:clrMapOvr>
+    <a:masterClrMapping/>
+  </p:clrMapOvr>
+</p:notes>
+</file>
+
 <file path=ppt/notesSlides/notesSlide2.xml><?xml version="1.0" encoding="utf-8"?>
 <p:notes xmlns:a="http://schemas.openxmlformats.org/drawingml/2006/main" xmlns:r="http://schemas.openxmlformats.org/officeDocument/2006/relationships" xmlns:p="http://schemas.openxmlformats.org/presentationml/2006/main">
   <p:cSld>
@@ -1737,7 +1870,7 @@
             <a:fld id="{1C2D31DE-C454-491C-B5C3-F097855E3DF7}" type="datetime4">
               <a:rPr lang="en-US" smtClean="0"/>
               <a:pPr/>
-              <a:t>March 1, 2023</a:t>
+              <a:t>January 22, 2025</a:t>
             </a:fld>
             <a:endParaRPr lang="en-US" dirty="0"/>
           </a:p>
@@ -5129,7 +5262,7 @@
           <a:p>
             <a:fld id="{5958763E-B898-436D-883D-03711491D54A}" type="datetimeFigureOut">
               <a:rPr lang="en-US" smtClean="0"/>
-              <a:t>3/1/2023</a:t>
+              <a:t>1/22/2025</a:t>
             </a:fld>
             <a:endParaRPr lang="en-US"/>
           </a:p>
@@ -5322,7 +5455,7 @@
           <a:p>
             <a:fld id="{5958763E-B898-436D-883D-03711491D54A}" type="datetimeFigureOut">
               <a:rPr lang="en-US" smtClean="0"/>
-              <a:t>3/1/2023</a:t>
+              <a:t>1/22/2025</a:t>
             </a:fld>
             <a:endParaRPr lang="en-US"/>
           </a:p>
@@ -5572,7 +5705,7 @@
           <a:p>
             <a:fld id="{5958763E-B898-436D-883D-03711491D54A}" type="datetimeFigureOut">
               <a:rPr lang="en-US" smtClean="0"/>
-              <a:t>3/1/2023</a:t>
+              <a:t>1/22/2025</a:t>
             </a:fld>
             <a:endParaRPr lang="en-US"/>
           </a:p>
@@ -5920,7 +6053,7 @@
           <a:p>
             <a:fld id="{5958763E-B898-436D-883D-03711491D54A}" type="datetimeFigureOut">
               <a:rPr lang="en-US" smtClean="0"/>
-              <a:t>3/1/2023</a:t>
+              <a:t>1/22/2025</a:t>
             </a:fld>
             <a:endParaRPr lang="en-US"/>
           </a:p>
@@ -6336,7 +6469,7 @@
           <a:p>
             <a:fld id="{5958763E-B898-436D-883D-03711491D54A}" type="datetimeFigureOut">
               <a:rPr lang="en-US" smtClean="0"/>
-              <a:t>3/1/2023</a:t>
+              <a:t>1/22/2025</a:t>
             </a:fld>
             <a:endParaRPr lang="en-US"/>
           </a:p>
@@ -6837,7 +6970,7 @@
           <a:p>
             <a:fld id="{5958763E-B898-436D-883D-03711491D54A}" type="datetimeFigureOut">
               <a:rPr lang="en-US" smtClean="0"/>
-              <a:t>3/1/2023</a:t>
+              <a:t>1/22/2025</a:t>
             </a:fld>
             <a:endParaRPr lang="en-US"/>
           </a:p>
@@ -7288,7 +7421,7 @@
           <a:p>
             <a:fld id="{5958763E-B898-436D-883D-03711491D54A}" type="datetimeFigureOut">
               <a:rPr lang="en-US" smtClean="0"/>
-              <a:t>3/1/2023</a:t>
+              <a:t>1/22/2025</a:t>
             </a:fld>
             <a:endParaRPr lang="en-US"/>
           </a:p>
@@ -7899,7 +8032,7 @@
           <a:p>
             <a:fld id="{5958763E-B898-436D-883D-03711491D54A}" type="datetimeFigureOut">
               <a:rPr lang="en-US" smtClean="0"/>
-              <a:t>3/1/2023</a:t>
+              <a:t>1/22/2025</a:t>
             </a:fld>
             <a:endParaRPr lang="en-US"/>
           </a:p>
@@ -8670,7 +8803,7 @@
           <a:p>
             <a:fld id="{5958763E-B898-436D-883D-03711491D54A}" type="datetimeFigureOut">
               <a:rPr lang="en-US" smtClean="0"/>
-              <a:t>3/1/2023</a:t>
+              <a:t>1/22/2025</a:t>
             </a:fld>
             <a:endParaRPr lang="en-US"/>
           </a:p>
@@ -8774,7 +8907,7 @@
           <a:p>
             <a:fld id="{5958763E-B898-436D-883D-03711491D54A}" type="datetimeFigureOut">
               <a:rPr lang="en-US" smtClean="0"/>
-              <a:t>3/1/2023</a:t>
+              <a:t>1/22/2025</a:t>
             </a:fld>
             <a:endParaRPr lang="en-US"/>
           </a:p>
@@ -9101,7 +9234,7 @@
             <a:fld id="{1C2D31DE-C454-491C-B5C3-F097855E3DF7}" type="datetime4">
               <a:rPr lang="en-US" smtClean="0"/>
               <a:pPr/>
-              <a:t>March 1, 2023</a:t>
+              <a:t>January 22, 2025</a:t>
             </a:fld>
             <a:endParaRPr lang="en-US" dirty="0"/>
           </a:p>
@@ -12253,7 +12386,7 @@
           <a:p>
             <a:fld id="{5958763E-B898-436D-883D-03711491D54A}" type="datetimeFigureOut">
               <a:rPr lang="en-US" smtClean="0"/>
-              <a:t>3/1/2023</a:t>
+              <a:t>1/22/2025</a:t>
             </a:fld>
             <a:endParaRPr lang="en-US"/>
           </a:p>
@@ -12377,7 +12510,7 @@
           <a:p>
             <a:fld id="{5958763E-B898-436D-883D-03711491D54A}" type="datetimeFigureOut">
               <a:rPr lang="en-US" smtClean="0"/>
-              <a:t>3/1/2023</a:t>
+              <a:t>1/22/2025</a:t>
             </a:fld>
             <a:endParaRPr lang="en-US"/>
           </a:p>
@@ -12501,7 +12634,7 @@
           <a:p>
             <a:fld id="{5958763E-B898-436D-883D-03711491D54A}" type="datetimeFigureOut">
               <a:rPr lang="en-US" smtClean="0"/>
-              <a:t>3/1/2023</a:t>
+              <a:t>1/22/2025</a:t>
             </a:fld>
             <a:endParaRPr lang="en-US"/>
           </a:p>
@@ -12625,7 +12758,7 @@
           <a:p>
             <a:fld id="{5958763E-B898-436D-883D-03711491D54A}" type="datetimeFigureOut">
               <a:rPr lang="en-US" smtClean="0"/>
-              <a:t>3/1/2023</a:t>
+              <a:t>1/22/2025</a:t>
             </a:fld>
             <a:endParaRPr lang="en-US"/>
           </a:p>
@@ -12749,7 +12882,7 @@
           <a:p>
             <a:fld id="{5958763E-B898-436D-883D-03711491D54A}" type="datetimeFigureOut">
               <a:rPr lang="en-US" smtClean="0"/>
-              <a:t>3/1/2023</a:t>
+              <a:t>1/22/2025</a:t>
             </a:fld>
             <a:endParaRPr lang="en-US"/>
           </a:p>
@@ -12873,7 +13006,7 @@
           <a:p>
             <a:fld id="{5958763E-B898-436D-883D-03711491D54A}" type="datetimeFigureOut">
               <a:rPr lang="en-US" smtClean="0"/>
-              <a:t>3/1/2023</a:t>
+              <a:t>1/22/2025</a:t>
             </a:fld>
             <a:endParaRPr lang="en-US"/>
           </a:p>
@@ -12997,7 +13130,7 @@
           <a:p>
             <a:fld id="{5958763E-B898-436D-883D-03711491D54A}" type="datetimeFigureOut">
               <a:rPr lang="en-US" smtClean="0"/>
-              <a:t>3/1/2023</a:t>
+              <a:t>1/22/2025</a:t>
             </a:fld>
             <a:endParaRPr lang="en-US"/>
           </a:p>
@@ -13121,7 +13254,7 @@
           <a:p>
             <a:fld id="{5958763E-B898-436D-883D-03711491D54A}" type="datetimeFigureOut">
               <a:rPr lang="en-US" smtClean="0"/>
-              <a:t>3/1/2023</a:t>
+              <a:t>1/22/2025</a:t>
             </a:fld>
             <a:endParaRPr lang="en-US"/>
           </a:p>
@@ -13254,7 +13387,7 @@
           <a:p>
             <a:fld id="{5958763E-B898-436D-883D-03711491D54A}" type="datetimeFigureOut">
               <a:rPr lang="en-US" smtClean="0"/>
-              <a:t>3/1/2023</a:t>
+              <a:t>1/22/2025</a:t>
             </a:fld>
             <a:endParaRPr lang="en-US"/>
           </a:p>
@@ -16593,7 +16726,7 @@
             <a:fld id="{1C2D31DE-C454-491C-B5C3-F097855E3DF7}" type="datetime4">
               <a:rPr lang="en-US" smtClean="0"/>
               <a:pPr/>
-              <a:t>March 1, 2023</a:t>
+              <a:t>January 22, 2025</a:t>
             </a:fld>
             <a:endParaRPr lang="en-US" dirty="0"/>
           </a:p>
@@ -28829,7 +28962,7 @@
           <a:p>
             <a:fld id="{5958763E-B898-436D-883D-03711491D54A}" type="datetimeFigureOut">
               <a:rPr lang="en-US" smtClean="0"/>
-              <a:t>3/1/2023</a:t>
+              <a:t>1/22/2025</a:t>
             </a:fld>
             <a:endParaRPr lang="en-US"/>
           </a:p>
@@ -29231,7 +29364,7 @@
           <a:p>
             <a:fld id="{5958763E-B898-436D-883D-03711491D54A}" type="datetimeFigureOut">
               <a:rPr lang="en-US" smtClean="0"/>
-              <a:t>3/1/2023</a:t>
+              <a:t>1/22/2025</a:t>
             </a:fld>
             <a:endParaRPr lang="en-US"/>
           </a:p>
@@ -29525,7 +29658,7 @@
           <a:p>
             <a:fld id="{5958763E-B898-436D-883D-03711491D54A}" type="datetimeFigureOut">
               <a:rPr lang="en-US" smtClean="0"/>
-              <a:t>3/1/2023</a:t>
+              <a:t>1/22/2025</a:t>
             </a:fld>
             <a:endParaRPr lang="en-US"/>
           </a:p>
@@ -29726,7 +29859,7 @@
           <a:p>
             <a:fld id="{5958763E-B898-436D-883D-03711491D54A}" type="datetimeFigureOut">
               <a:rPr lang="en-US" smtClean="0"/>
-              <a:t>3/1/2023</a:t>
+              <a:t>1/22/2025</a:t>
             </a:fld>
             <a:endParaRPr lang="en-US"/>
           </a:p>
@@ -29987,7 +30120,7 @@
           <a:p>
             <a:fld id="{5958763E-B898-436D-883D-03711491D54A}" type="datetimeFigureOut">
               <a:rPr lang="en-US" smtClean="0"/>
-              <a:t>3/1/2023</a:t>
+              <a:t>1/22/2025</a:t>
             </a:fld>
             <a:endParaRPr lang="en-US"/>
           </a:p>
@@ -30495,7 +30628,7 @@
           <a:p>
             <a:fld id="{5958763E-B898-436D-883D-03711491D54A}" type="datetimeFigureOut">
               <a:rPr lang="en-US" smtClean="0"/>
-              <a:t>3/1/2023</a:t>
+              <a:t>1/22/2025</a:t>
             </a:fld>
             <a:endParaRPr lang="en-US"/>
           </a:p>
@@ -30974,7 +31107,7 @@
           <a:p>
             <a:fld id="{5958763E-B898-436D-883D-03711491D54A}" type="datetimeFigureOut">
               <a:rPr lang="en-US" smtClean="0"/>
-              <a:t>3/1/2023</a:t>
+              <a:t>1/22/2025</a:t>
             </a:fld>
             <a:endParaRPr lang="en-US"/>
           </a:p>
@@ -31793,7 +31926,7 @@
           <a:p>
             <a:fld id="{5958763E-B898-436D-883D-03711491D54A}" type="datetimeFigureOut">
               <a:rPr lang="en-US" smtClean="0"/>
-              <a:t>3/1/2023</a:t>
+              <a:t>1/22/2025</a:t>
             </a:fld>
             <a:endParaRPr lang="en-US"/>
           </a:p>
@@ -31994,7 +32127,7 @@
           <a:p>
             <a:fld id="{5958763E-B898-436D-883D-03711491D54A}" type="datetimeFigureOut">
               <a:rPr lang="en-US" smtClean="0"/>
-              <a:t>3/1/2023</a:t>
+              <a:t>1/22/2025</a:t>
             </a:fld>
             <a:endParaRPr lang="en-US"/>
           </a:p>
@@ -32329,7 +32462,7 @@
           <a:p>
             <a:fld id="{5958763E-B898-436D-883D-03711491D54A}" type="datetimeFigureOut">
               <a:rPr lang="en-US" smtClean="0"/>
-              <a:t>3/1/2023</a:t>
+              <a:t>1/22/2025</a:t>
             </a:fld>
             <a:endParaRPr lang="en-US"/>
           </a:p>
@@ -32559,7 +32692,7 @@
           <a:p>
             <a:fld id="{5958763E-B898-436D-883D-03711491D54A}" type="datetimeFigureOut">
               <a:rPr lang="en-US" smtClean="0"/>
-              <a:t>3/1/2023</a:t>
+              <a:t>1/22/2025</a:t>
             </a:fld>
             <a:endParaRPr lang="en-US"/>
           </a:p>
@@ -32803,7 +32936,7 @@
           <a:p>
             <a:fld id="{5958763E-B898-436D-883D-03711491D54A}" type="datetimeFigureOut">
               <a:rPr lang="en-US" smtClean="0"/>
-              <a:t>3/1/2023</a:t>
+              <a:t>1/22/2025</a:t>
             </a:fld>
             <a:endParaRPr lang="en-US"/>
           </a:p>
@@ -36575,6 +36708,119 @@
 </file>
 
 <file path=ppt/slides/slide11.xml><?xml version="1.0" encoding="utf-8"?>
+<p:sld xmlns:a="http://schemas.openxmlformats.org/drawingml/2006/main" xmlns:r="http://schemas.openxmlformats.org/officeDocument/2006/relationships" xmlns:p="http://schemas.openxmlformats.org/presentationml/2006/main">
+  <p:cSld>
+    <p:bg>
+      <p:bgPr>
+        <a:solidFill>
+          <a:schemeClr val="tx1">
+            <a:lumMod val="50000"/>
+          </a:schemeClr>
+        </a:solidFill>
+        <a:effectLst/>
+      </p:bgPr>
+    </p:bg>
+    <p:spTree>
+      <p:nvGrpSpPr>
+        <p:cNvPr id="1" name="">
+          <a:extLst>
+            <a:ext uri="{FF2B5EF4-FFF2-40B4-BE49-F238E27FC236}">
+              <a16:creationId xmlns:a16="http://schemas.microsoft.com/office/drawing/2014/main" id="{60FE4B41-E2AA-11C7-319E-3B0491CA46A2}"/>
+            </a:ext>
+          </a:extLst>
+        </p:cNvPr>
+        <p:cNvGrpSpPr/>
+        <p:nvPr/>
+      </p:nvGrpSpPr>
+      <p:grpSpPr>
+        <a:xfrm>
+          <a:off x="0" y="0"/>
+          <a:ext cx="0" cy="0"/>
+          <a:chOff x="0" y="0"/>
+          <a:chExt cx="0" cy="0"/>
+        </a:xfrm>
+      </p:grpSpPr>
+      <p:sp>
+        <p:nvSpPr>
+          <p:cNvPr id="2" name="Title 1">
+            <a:extLst>
+              <a:ext uri="{FF2B5EF4-FFF2-40B4-BE49-F238E27FC236}">
+                <a16:creationId xmlns:a16="http://schemas.microsoft.com/office/drawing/2014/main" id="{75F429F1-8AEA-1114-6235-AE79832426C2}"/>
+              </a:ext>
+            </a:extLst>
+          </p:cNvPr>
+          <p:cNvSpPr>
+            <a:spLocks noGrp="1"/>
+          </p:cNvSpPr>
+          <p:nvPr>
+            <p:ph type="title"/>
+          </p:nvPr>
+        </p:nvSpPr>
+        <p:spPr/>
+        <p:txBody>
+          <a:bodyPr/>
+          <a:lstStyle/>
+          <a:p>
+            <a:r>
+              <a:rPr lang="en-US" dirty="0"/>
+              <a:t>Prompt example</a:t>
+            </a:r>
+          </a:p>
+        </p:txBody>
+      </p:sp>
+      <p:sp>
+        <p:nvSpPr>
+          <p:cNvPr id="3" name="Content Placeholder 2">
+            <a:extLst>
+              <a:ext uri="{FF2B5EF4-FFF2-40B4-BE49-F238E27FC236}">
+                <a16:creationId xmlns:a16="http://schemas.microsoft.com/office/drawing/2014/main" id="{E3F4FBEA-EF85-DA38-43AB-1C6734909377}"/>
+              </a:ext>
+            </a:extLst>
+          </p:cNvPr>
+          <p:cNvSpPr>
+            <a:spLocks noGrp="1"/>
+          </p:cNvSpPr>
+          <p:nvPr>
+            <p:ph idx="1"/>
+          </p:nvPr>
+        </p:nvSpPr>
+        <p:spPr/>
+        <p:txBody>
+          <a:bodyPr>
+            <a:noAutofit/>
+          </a:bodyPr>
+          <a:lstStyle/>
+          <a:p>
+            <a:pPr marL="57150" indent="0">
+              <a:buNone/>
+            </a:pPr>
+            <a:r>
+              <a:rPr lang="en-US" sz="13800" dirty="0">
+                <a:hlinkClick r:id="rId3"/>
+              </a:rPr>
+              <a:t>https://jsfiddle.net/tjrso1ae/</a:t>
+            </a:r>
+            <a:endParaRPr lang="en-US" sz="13800" dirty="0"/>
+          </a:p>
+        </p:txBody>
+      </p:sp>
+    </p:spTree>
+    <p:extLst>
+      <p:ext uri="{BB962C8B-B14F-4D97-AF65-F5344CB8AC3E}">
+        <p14:creationId xmlns:p14="http://schemas.microsoft.com/office/powerpoint/2010/main" val="1542410468"/>
+      </p:ext>
+    </p:extLst>
+  </p:cSld>
+  <p:clrMapOvr>
+    <a:masterClrMapping/>
+  </p:clrMapOvr>
+  <p:transition>
+    <p:fade/>
+  </p:transition>
+</p:sld>
+</file>
+
+<file path=ppt/slides/slide12.xml><?xml version="1.0" encoding="utf-8"?>
 <p:sld xmlns:a="http://schemas.openxmlformats.org/drawingml/2006/main" xmlns:r="http://schemas.openxmlformats.org/officeDocument/2006/relationships" xmlns:p="http://schemas.openxmlformats.org/presentationml/2006/main">
   <p:cSld>
     <p:spTree>
@@ -39640,12 +39886,12 @@
               <a:buNone/>
             </a:pPr>
             <a:r>
-              <a:rPr lang="en-US" sz="8800" dirty="0">
+              <a:rPr lang="en-US" sz="13800" dirty="0">
                 <a:hlinkClick r:id="rId3"/>
               </a:rPr>
-              <a:t>https://replit.com/@HylandOutreach/VariablesExample#script.js</a:t>
+              <a:t>https://jsfiddle.net/3q0tcoxj/</a:t>
             </a:r>
-            <a:endParaRPr lang="en-US" sz="9600" dirty="0"/>
+            <a:endParaRPr lang="en-US" sz="13800" dirty="0"/>
           </a:p>
         </p:txBody>
       </p:sp>

</xml_diff>